<commit_message>
Update Sustainable Forms presentation.pptx
</commit_message>
<xml_diff>
--- a/Delredovisning/Sustainable Forms presentation.pptx
+++ b/Delredovisning/Sustainable Forms presentation.pptx
@@ -6,8 +6,14 @@
   </p:sldMasterIdLst>
   <p:sldIdLst>
     <p:sldId id="256" r:id="rId2"/>
-    <p:sldId id="257" r:id="rId3"/>
-    <p:sldId id="258" r:id="rId4"/>
+    <p:sldId id="259" r:id="rId3"/>
+    <p:sldId id="260" r:id="rId4"/>
+    <p:sldId id="264" r:id="rId5"/>
+    <p:sldId id="262" r:id="rId6"/>
+    <p:sldId id="257" r:id="rId7"/>
+    <p:sldId id="258" r:id="rId8"/>
+    <p:sldId id="263" r:id="rId9"/>
+    <p:sldId id="261" r:id="rId10"/>
   </p:sldIdLst>
   <p:sldSz cx="12192000" cy="6858000"/>
   <p:notesSz cx="6858000" cy="9144000"/>
@@ -106,6 +112,11 @@
       </a:defRPr>
     </a:lvl9pPr>
   </p:defaultTextStyle>
+  <p:extLst>
+    <p:ext uri="{EFAFB233-063F-42B5-8137-9DF3F51BA10A}">
+      <p15:sldGuideLst xmlns:p15="http://schemas.microsoft.com/office/powerpoint/2012/main"/>
+    </p:ext>
+  </p:extLst>
 </p:presentation>
 </file>
 
@@ -7939,31 +7950,14 @@
               </a:lnSpc>
             </a:pPr>
             <a:r>
-              <a:rPr lang="sv-SE" sz="2000">
+              <a:rPr lang="sv-SE" sz="2000" dirty="0">
                 <a:solidFill>
                   <a:schemeClr val="tx1">
                     <a:alpha val="60000"/>
                   </a:schemeClr>
                 </a:solidFill>
               </a:rPr>
-              <a:t>Webbaserat rapporteringsverktyg utvecklat på uppdrag av</a:t>
-            </a:r>
-          </a:p>
-          <a:p>
-            <a:pPr>
-              <a:lnSpc>
-                <a:spcPct val="90000"/>
-              </a:lnSpc>
-            </a:pPr>
-            <a:r>
-              <a:rPr lang="sv-SE" sz="2000">
-                <a:solidFill>
-                  <a:schemeClr val="tx1">
-                    <a:alpha val="60000"/>
-                  </a:schemeClr>
-                </a:solidFill>
-              </a:rPr>
-              <a:t>Helsingborg Convention and Event Bureau</a:t>
+              <a:t>Webbaserat rapporteringsverktyg utvecklat på uppdrag av Helsingborg Convention and Event Bureau</a:t>
             </a:r>
           </a:p>
         </p:txBody>
@@ -8650,70 +8644,6 @@
                       </p:childTnLst>
                     </p:cTn>
                   </p:par>
-                  <p:par>
-                    <p:cTn id="11" fill="hold">
-                      <p:stCondLst>
-                        <p:cond delay="indefinite"/>
-                      </p:stCondLst>
-                      <p:childTnLst>
-                        <p:par>
-                          <p:cTn id="12" fill="hold">
-                            <p:stCondLst>
-                              <p:cond delay="0"/>
-                            </p:stCondLst>
-                            <p:childTnLst>
-                              <p:par>
-                                <p:cTn id="13" presetID="10" presetClass="entr" presetSubtype="0" fill="hold" grpId="0" nodeType="clickEffect">
-                                  <p:stCondLst>
-                                    <p:cond delay="2000"/>
-                                  </p:stCondLst>
-                                  <p:iterate type="lt">
-                                    <p:tmPct val="10000"/>
-                                  </p:iterate>
-                                  <p:childTnLst>
-                                    <p:set>
-                                      <p:cBhvr>
-                                        <p:cTn id="14" dur="1" fill="hold">
-                                          <p:stCondLst>
-                                            <p:cond delay="0"/>
-                                          </p:stCondLst>
-                                        </p:cTn>
-                                        <p:tgtEl>
-                                          <p:spTgt spid="3">
-                                            <p:txEl>
-                                              <p:pRg st="1" end="1"/>
-                                            </p:txEl>
-                                          </p:spTgt>
-                                        </p:tgtEl>
-                                        <p:attrNameLst>
-                                          <p:attrName>style.visibility</p:attrName>
-                                        </p:attrNameLst>
-                                      </p:cBhvr>
-                                      <p:to>
-                                        <p:strVal val="visible"/>
-                                      </p:to>
-                                    </p:set>
-                                    <p:animEffect transition="in" filter="fade">
-                                      <p:cBhvr>
-                                        <p:cTn id="15" dur="400"/>
-                                        <p:tgtEl>
-                                          <p:spTgt spid="3">
-                                            <p:txEl>
-                                              <p:pRg st="1" end="1"/>
-                                            </p:txEl>
-                                          </p:spTgt>
-                                        </p:tgtEl>
-                                      </p:cBhvr>
-                                    </p:animEffect>
-                                  </p:childTnLst>
-                                </p:cTn>
-                              </p:par>
-                            </p:childTnLst>
-                          </p:cTn>
-                        </p:par>
-                      </p:childTnLst>
-                    </p:cTn>
-                  </p:par>
                 </p:childTnLst>
               </p:cTn>
               <p:prevCondLst>
@@ -8765,7 +8695,7 @@
           <p:cNvPr id="2" name="Rubrik 1">
             <a:extLst>
               <a:ext uri="{FF2B5EF4-FFF2-40B4-BE49-F238E27FC236}">
-                <a16:creationId xmlns:a16="http://schemas.microsoft.com/office/drawing/2014/main" id="{17435730-1ECE-4013-A9AE-4E214FED0832}"/>
+                <a16:creationId xmlns:a16="http://schemas.microsoft.com/office/drawing/2014/main" id="{6C111A7D-0EE4-422B-98C4-1BA56F5B4233}"/>
               </a:ext>
             </a:extLst>
           </p:cNvPr>
@@ -8778,12 +8708,14 @@
         </p:nvSpPr>
         <p:spPr/>
         <p:txBody>
-          <a:bodyPr/>
+          <a:bodyPr>
+            <a:normAutofit/>
+          </a:bodyPr>
           <a:lstStyle/>
           <a:p>
             <a:r>
-              <a:rPr lang="sv-SE" dirty="0"/>
-              <a:t>Var är vi nu?</a:t>
+              <a:rPr lang="sv-SE" sz="4800" dirty="0"/>
+              <a:t>Var är vi nu? </a:t>
             </a:r>
           </a:p>
         </p:txBody>
@@ -8793,7 +8725,7 @@
           <p:cNvPr id="3" name="Platshållare för innehåll 2">
             <a:extLst>
               <a:ext uri="{FF2B5EF4-FFF2-40B4-BE49-F238E27FC236}">
-                <a16:creationId xmlns:a16="http://schemas.microsoft.com/office/drawing/2014/main" id="{9A5988AF-121F-493F-BE57-EE0811CBA2AE}"/>
+                <a16:creationId xmlns:a16="http://schemas.microsoft.com/office/drawing/2014/main" id="{7F98FC68-7BBE-4365-A81C-21CFE3B7891B}"/>
               </a:ext>
             </a:extLst>
           </p:cNvPr>
@@ -8806,31 +8738,54 @@
         </p:nvSpPr>
         <p:spPr/>
         <p:txBody>
-          <a:bodyPr/>
+          <a:bodyPr>
+            <a:normAutofit/>
+          </a:bodyPr>
           <a:lstStyle/>
           <a:p>
             <a:pPr marL="0" indent="0">
               <a:buNone/>
             </a:pPr>
-            <a:r>
-              <a:rPr lang="sv-SE" dirty="0"/>
-              <a:t>Designval och prototyp</a:t>
-            </a:r>
-          </a:p>
-          <a:p>
-            <a:pPr marL="0" indent="0">
-              <a:buNone/>
-            </a:pPr>
-            <a:endParaRPr lang="sv-SE" dirty="0"/>
+            <a:endParaRPr lang="sv-SE" sz="3600" dirty="0"/>
+          </a:p>
+        </p:txBody>
+      </p:sp>
+      <p:sp>
+        <p:nvSpPr>
+          <p:cNvPr id="4" name="Platshållare för text 3">
+            <a:extLst>
+              <a:ext uri="{FF2B5EF4-FFF2-40B4-BE49-F238E27FC236}">
+                <a16:creationId xmlns:a16="http://schemas.microsoft.com/office/drawing/2014/main" id="{C2F014F2-41CC-4F74-8D6A-D461A555FF7A}"/>
+              </a:ext>
+            </a:extLst>
+          </p:cNvPr>
+          <p:cNvSpPr>
+            <a:spLocks noGrp="1"/>
+          </p:cNvSpPr>
+          <p:nvPr>
+            <p:ph type="body" sz="half" idx="2"/>
+          </p:nvPr>
+        </p:nvSpPr>
+        <p:spPr/>
+        <p:txBody>
+          <a:bodyPr>
+            <a:normAutofit/>
+          </a:bodyPr>
+          <a:lstStyle/>
+          <a:p>
+            <a:r>
+              <a:rPr lang="sv-SE" sz="3600" dirty="0"/>
+              <a:t>Planering		</a:t>
+            </a:r>
           </a:p>
         </p:txBody>
       </p:sp>
       <p:pic>
         <p:nvPicPr>
-          <p:cNvPr id="5" name="Bildobjekt 4">
-            <a:extLst>
-              <a:ext uri="{FF2B5EF4-FFF2-40B4-BE49-F238E27FC236}">
-                <a16:creationId xmlns:a16="http://schemas.microsoft.com/office/drawing/2014/main" id="{2D2A01BE-ABA3-49E3-8CAC-79F1A70CCFD7}"/>
+          <p:cNvPr id="6" name="Bildobjekt 5" descr="En bild som visar bord&#10;&#10;Automatiskt genererad beskrivning">
+            <a:extLst>
+              <a:ext uri="{FF2B5EF4-FFF2-40B4-BE49-F238E27FC236}">
+                <a16:creationId xmlns:a16="http://schemas.microsoft.com/office/drawing/2014/main" id="{240A34B5-9EE5-4917-BAD6-4D59187517E1}"/>
               </a:ext>
             </a:extLst>
           </p:cNvPr>
@@ -8840,37 +8795,7 @@
           <p:nvPr/>
         </p:nvPicPr>
         <p:blipFill>
-          <a:blip r:embed="rId2"/>
-          <a:stretch>
-            <a:fillRect/>
-          </a:stretch>
-        </p:blipFill>
-        <p:spPr>
-          <a:xfrm>
-            <a:off x="5317170" y="544470"/>
-            <a:ext cx="6167695" cy="3854810"/>
-          </a:xfrm>
-          <a:prstGeom prst="rect">
-            <a:avLst/>
-          </a:prstGeom>
-        </p:spPr>
-      </p:pic>
-      <p:pic>
-        <p:nvPicPr>
-          <p:cNvPr id="7" name="Bildobjekt 6" descr="En bild som visar text&#10;&#10;Automatiskt genererad beskrivning">
-            <a:extLst>
-              <a:ext uri="{FF2B5EF4-FFF2-40B4-BE49-F238E27FC236}">
-                <a16:creationId xmlns:a16="http://schemas.microsoft.com/office/drawing/2014/main" id="{2CDD859A-4B68-4D8B-BE6C-5B08BF761BFD}"/>
-              </a:ext>
-            </a:extLst>
-          </p:cNvPr>
-          <p:cNvPicPr>
-            <a:picLocks noChangeAspect="1"/>
-          </p:cNvPicPr>
-          <p:nvPr/>
-        </p:nvPicPr>
-        <p:blipFill>
-          <a:blip r:embed="rId3">
+          <a:blip r:embed="rId2">
             <a:extLst>
               <a:ext uri="{28A0092B-C50C-407E-A947-70E740481C1C}">
                 <a14:useLocalDpi xmlns:a14="http://schemas.microsoft.com/office/drawing/2010/main" val="0"/>
@@ -8883,8 +8808,8 @@
         </p:blipFill>
         <p:spPr>
           <a:xfrm>
-            <a:off x="433028" y="3317202"/>
-            <a:ext cx="3082332" cy="3159283"/>
+            <a:off x="1" y="2874708"/>
+            <a:ext cx="12198390" cy="3704767"/>
           </a:xfrm>
           <a:prstGeom prst="rect">
             <a:avLst/>
@@ -8894,7 +8819,7 @@
     </p:spTree>
     <p:extLst>
       <p:ext uri="{BB962C8B-B14F-4D97-AF65-F5344CB8AC3E}">
-        <p14:creationId xmlns:p14="http://schemas.microsoft.com/office/powerpoint/2010/main" val="1659018595"/>
+        <p14:creationId xmlns:p14="http://schemas.microsoft.com/office/powerpoint/2010/main" val="184268130"/>
       </p:ext>
     </p:extLst>
   </p:cSld>
@@ -8926,6 +8851,516 @@
           <p:cNvPr id="2" name="Rubrik 1">
             <a:extLst>
               <a:ext uri="{FF2B5EF4-FFF2-40B4-BE49-F238E27FC236}">
+                <a16:creationId xmlns:a16="http://schemas.microsoft.com/office/drawing/2014/main" id="{6C111A7D-0EE4-422B-98C4-1BA56F5B4233}"/>
+              </a:ext>
+            </a:extLst>
+          </p:cNvPr>
+          <p:cNvSpPr>
+            <a:spLocks noGrp="1"/>
+          </p:cNvSpPr>
+          <p:nvPr>
+            <p:ph type="title"/>
+          </p:nvPr>
+        </p:nvSpPr>
+        <p:spPr/>
+        <p:txBody>
+          <a:bodyPr>
+            <a:normAutofit/>
+          </a:bodyPr>
+          <a:lstStyle/>
+          <a:p>
+            <a:r>
+              <a:rPr lang="sv-SE" sz="4800" dirty="0"/>
+              <a:t>Var är vi nu? </a:t>
+            </a:r>
+          </a:p>
+        </p:txBody>
+      </p:sp>
+      <p:sp>
+        <p:nvSpPr>
+          <p:cNvPr id="3" name="Platshållare för innehåll 2">
+            <a:extLst>
+              <a:ext uri="{FF2B5EF4-FFF2-40B4-BE49-F238E27FC236}">
+                <a16:creationId xmlns:a16="http://schemas.microsoft.com/office/drawing/2014/main" id="{7F98FC68-7BBE-4365-A81C-21CFE3B7891B}"/>
+              </a:ext>
+            </a:extLst>
+          </p:cNvPr>
+          <p:cNvSpPr>
+            <a:spLocks noGrp="1"/>
+          </p:cNvSpPr>
+          <p:nvPr>
+            <p:ph idx="1"/>
+          </p:nvPr>
+        </p:nvSpPr>
+        <p:spPr/>
+        <p:txBody>
+          <a:bodyPr>
+            <a:normAutofit/>
+          </a:bodyPr>
+          <a:lstStyle/>
+          <a:p>
+            <a:r>
+              <a:rPr lang="sv-SE" sz="3600" dirty="0"/>
+              <a:t>Processrapport</a:t>
+            </a:r>
+          </a:p>
+          <a:p>
+            <a:r>
+              <a:rPr lang="sv-SE" sz="3600" dirty="0"/>
+              <a:t>Arbetsrapport</a:t>
+            </a:r>
+          </a:p>
+          <a:p>
+            <a:r>
+              <a:rPr lang="sv-SE" sz="3600" dirty="0"/>
+              <a:t>Kravspecifikation</a:t>
+            </a:r>
+          </a:p>
+        </p:txBody>
+      </p:sp>
+      <p:sp>
+        <p:nvSpPr>
+          <p:cNvPr id="4" name="Platshållare för text 3">
+            <a:extLst>
+              <a:ext uri="{FF2B5EF4-FFF2-40B4-BE49-F238E27FC236}">
+                <a16:creationId xmlns:a16="http://schemas.microsoft.com/office/drawing/2014/main" id="{C2F014F2-41CC-4F74-8D6A-D461A555FF7A}"/>
+              </a:ext>
+            </a:extLst>
+          </p:cNvPr>
+          <p:cNvSpPr>
+            <a:spLocks noGrp="1"/>
+          </p:cNvSpPr>
+          <p:nvPr>
+            <p:ph type="body" sz="half" idx="2"/>
+          </p:nvPr>
+        </p:nvSpPr>
+        <p:spPr/>
+        <p:txBody>
+          <a:bodyPr>
+            <a:normAutofit/>
+          </a:bodyPr>
+          <a:lstStyle/>
+          <a:p>
+            <a:r>
+              <a:rPr lang="sv-SE" sz="3600" dirty="0"/>
+              <a:t>Dokument</a:t>
+            </a:r>
+          </a:p>
+        </p:txBody>
+      </p:sp>
+    </p:spTree>
+    <p:extLst>
+      <p:ext uri="{BB962C8B-B14F-4D97-AF65-F5344CB8AC3E}">
+        <p14:creationId xmlns:p14="http://schemas.microsoft.com/office/powerpoint/2010/main" val="1499517303"/>
+      </p:ext>
+    </p:extLst>
+  </p:cSld>
+  <p:clrMapOvr>
+    <a:masterClrMapping/>
+  </p:clrMapOvr>
+</p:sld>
+</file>
+
+<file path=ppt/slides/slide4.xml><?xml version="1.0" encoding="utf-8"?>
+<p:sld xmlns:a="http://schemas.openxmlformats.org/drawingml/2006/main" xmlns:r="http://schemas.openxmlformats.org/officeDocument/2006/relationships" xmlns:p="http://schemas.openxmlformats.org/presentationml/2006/main">
+  <p:cSld>
+    <p:spTree>
+      <p:nvGrpSpPr>
+        <p:cNvPr id="1" name=""/>
+        <p:cNvGrpSpPr/>
+        <p:nvPr/>
+      </p:nvGrpSpPr>
+      <p:grpSpPr>
+        <a:xfrm>
+          <a:off x="0" y="0"/>
+          <a:ext cx="0" cy="0"/>
+          <a:chOff x="0" y="0"/>
+          <a:chExt cx="0" cy="0"/>
+        </a:xfrm>
+      </p:grpSpPr>
+      <p:sp>
+        <p:nvSpPr>
+          <p:cNvPr id="2" name="Rubrik 1">
+            <a:extLst>
+              <a:ext uri="{FF2B5EF4-FFF2-40B4-BE49-F238E27FC236}">
+                <a16:creationId xmlns:a16="http://schemas.microsoft.com/office/drawing/2014/main" id="{AE29F9FE-EC85-4E79-BCC8-FFAD2E09D04B}"/>
+              </a:ext>
+            </a:extLst>
+          </p:cNvPr>
+          <p:cNvSpPr>
+            <a:spLocks noGrp="1"/>
+          </p:cNvSpPr>
+          <p:nvPr>
+            <p:ph type="title"/>
+          </p:nvPr>
+        </p:nvSpPr>
+        <p:spPr/>
+        <p:txBody>
+          <a:bodyPr/>
+          <a:lstStyle/>
+          <a:p>
+            <a:r>
+              <a:rPr lang="sv-SE" dirty="0"/>
+              <a:t>Resultat av projektcoachning</a:t>
+            </a:r>
+          </a:p>
+        </p:txBody>
+      </p:sp>
+      <p:sp>
+        <p:nvSpPr>
+          <p:cNvPr id="3" name="Platshållare för innehåll 2">
+            <a:extLst>
+              <a:ext uri="{FF2B5EF4-FFF2-40B4-BE49-F238E27FC236}">
+                <a16:creationId xmlns:a16="http://schemas.microsoft.com/office/drawing/2014/main" id="{67BAD7E8-8DEC-4180-9B03-BBB75641AF6D}"/>
+              </a:ext>
+            </a:extLst>
+          </p:cNvPr>
+          <p:cNvSpPr>
+            <a:spLocks noGrp="1"/>
+          </p:cNvSpPr>
+          <p:nvPr>
+            <p:ph sz="half" idx="1"/>
+          </p:nvPr>
+        </p:nvSpPr>
+        <p:spPr/>
+        <p:txBody>
+          <a:bodyPr/>
+          <a:lstStyle/>
+          <a:p>
+            <a:pPr marL="0" indent="0">
+              <a:buNone/>
+            </a:pPr>
+            <a:r>
+              <a:rPr lang="sv-SE" dirty="0"/>
+              <a:t>Utmaningar</a:t>
+            </a:r>
+          </a:p>
+        </p:txBody>
+      </p:sp>
+      <p:sp>
+        <p:nvSpPr>
+          <p:cNvPr id="4" name="Platshållare för innehåll 3">
+            <a:extLst>
+              <a:ext uri="{FF2B5EF4-FFF2-40B4-BE49-F238E27FC236}">
+                <a16:creationId xmlns:a16="http://schemas.microsoft.com/office/drawing/2014/main" id="{5A625CEB-5F33-476E-BC8C-6CF177CE8FA6}"/>
+              </a:ext>
+            </a:extLst>
+          </p:cNvPr>
+          <p:cNvSpPr>
+            <a:spLocks noGrp="1"/>
+          </p:cNvSpPr>
+          <p:nvPr>
+            <p:ph sz="half" idx="2"/>
+          </p:nvPr>
+        </p:nvSpPr>
+        <p:spPr/>
+        <p:txBody>
+          <a:bodyPr/>
+          <a:lstStyle/>
+          <a:p>
+            <a:pPr marL="0" indent="0">
+              <a:buNone/>
+            </a:pPr>
+            <a:r>
+              <a:rPr lang="sv-SE" dirty="0"/>
+              <a:t>Styrkor</a:t>
+            </a:r>
+          </a:p>
+        </p:txBody>
+      </p:sp>
+    </p:spTree>
+    <p:extLst>
+      <p:ext uri="{BB962C8B-B14F-4D97-AF65-F5344CB8AC3E}">
+        <p14:creationId xmlns:p14="http://schemas.microsoft.com/office/powerpoint/2010/main" val="315823071"/>
+      </p:ext>
+    </p:extLst>
+  </p:cSld>
+  <p:clrMapOvr>
+    <a:masterClrMapping/>
+  </p:clrMapOvr>
+</p:sld>
+</file>
+
+<file path=ppt/slides/slide5.xml><?xml version="1.0" encoding="utf-8"?>
+<p:sld xmlns:a="http://schemas.openxmlformats.org/drawingml/2006/main" xmlns:r="http://schemas.openxmlformats.org/officeDocument/2006/relationships" xmlns:p="http://schemas.openxmlformats.org/presentationml/2006/main">
+  <p:cSld>
+    <p:spTree>
+      <p:nvGrpSpPr>
+        <p:cNvPr id="1" name=""/>
+        <p:cNvGrpSpPr/>
+        <p:nvPr/>
+      </p:nvGrpSpPr>
+      <p:grpSpPr>
+        <a:xfrm>
+          <a:off x="0" y="0"/>
+          <a:ext cx="0" cy="0"/>
+          <a:chOff x="0" y="0"/>
+          <a:chExt cx="0" cy="0"/>
+        </a:xfrm>
+      </p:grpSpPr>
+      <p:sp>
+        <p:nvSpPr>
+          <p:cNvPr id="2" name="Rubrik 1">
+            <a:extLst>
+              <a:ext uri="{FF2B5EF4-FFF2-40B4-BE49-F238E27FC236}">
+                <a16:creationId xmlns:a16="http://schemas.microsoft.com/office/drawing/2014/main" id="{4A73ED04-710A-497D-88FC-AFCF485E217A}"/>
+              </a:ext>
+            </a:extLst>
+          </p:cNvPr>
+          <p:cNvSpPr>
+            <a:spLocks noGrp="1"/>
+          </p:cNvSpPr>
+          <p:nvPr>
+            <p:ph type="title"/>
+          </p:nvPr>
+        </p:nvSpPr>
+        <p:spPr/>
+        <p:txBody>
+          <a:bodyPr/>
+          <a:lstStyle/>
+          <a:p>
+            <a:r>
+              <a:rPr lang="sv-SE" dirty="0"/>
+              <a:t>Design och UX</a:t>
+            </a:r>
+          </a:p>
+        </p:txBody>
+      </p:sp>
+      <p:sp>
+        <p:nvSpPr>
+          <p:cNvPr id="3" name="Platshållare för innehåll 2">
+            <a:extLst>
+              <a:ext uri="{FF2B5EF4-FFF2-40B4-BE49-F238E27FC236}">
+                <a16:creationId xmlns:a16="http://schemas.microsoft.com/office/drawing/2014/main" id="{F70E1F3E-E2D4-4E6A-8F4E-4C4DC11B625F}"/>
+              </a:ext>
+            </a:extLst>
+          </p:cNvPr>
+          <p:cNvSpPr>
+            <a:spLocks noGrp="1"/>
+          </p:cNvSpPr>
+          <p:nvPr>
+            <p:ph idx="1"/>
+          </p:nvPr>
+        </p:nvSpPr>
+        <p:spPr/>
+        <p:txBody>
+          <a:bodyPr/>
+          <a:lstStyle/>
+          <a:p>
+            <a:r>
+              <a:rPr lang="sv-SE" dirty="0"/>
+              <a:t>Användarvänlighet ett centralt krav</a:t>
+            </a:r>
+          </a:p>
+          <a:p>
+            <a:r>
+              <a:rPr lang="sv-SE" dirty="0"/>
+              <a:t>Begränsade valmöjligheter</a:t>
+            </a:r>
+          </a:p>
+          <a:p>
+            <a:r>
+              <a:rPr lang="sv-SE" dirty="0"/>
+              <a:t>Enkelt gränssnitt</a:t>
+            </a:r>
+          </a:p>
+        </p:txBody>
+      </p:sp>
+    </p:spTree>
+    <p:extLst>
+      <p:ext uri="{BB962C8B-B14F-4D97-AF65-F5344CB8AC3E}">
+        <p14:creationId xmlns:p14="http://schemas.microsoft.com/office/powerpoint/2010/main" val="23674263"/>
+      </p:ext>
+    </p:extLst>
+  </p:cSld>
+  <p:clrMapOvr>
+    <a:masterClrMapping/>
+  </p:clrMapOvr>
+</p:sld>
+</file>
+
+<file path=ppt/slides/slide6.xml><?xml version="1.0" encoding="utf-8"?>
+<p:sld xmlns:a="http://schemas.openxmlformats.org/drawingml/2006/main" xmlns:r="http://schemas.openxmlformats.org/officeDocument/2006/relationships" xmlns:p="http://schemas.openxmlformats.org/presentationml/2006/main">
+  <p:cSld>
+    <p:spTree>
+      <p:nvGrpSpPr>
+        <p:cNvPr id="1" name=""/>
+        <p:cNvGrpSpPr/>
+        <p:nvPr/>
+      </p:nvGrpSpPr>
+      <p:grpSpPr>
+        <a:xfrm>
+          <a:off x="0" y="0"/>
+          <a:ext cx="0" cy="0"/>
+          <a:chOff x="0" y="0"/>
+          <a:chExt cx="0" cy="0"/>
+        </a:xfrm>
+      </p:grpSpPr>
+      <p:sp>
+        <p:nvSpPr>
+          <p:cNvPr id="2" name="Rubrik 1">
+            <a:extLst>
+              <a:ext uri="{FF2B5EF4-FFF2-40B4-BE49-F238E27FC236}">
+                <a16:creationId xmlns:a16="http://schemas.microsoft.com/office/drawing/2014/main" id="{17435730-1ECE-4013-A9AE-4E214FED0832}"/>
+              </a:ext>
+            </a:extLst>
+          </p:cNvPr>
+          <p:cNvSpPr>
+            <a:spLocks noGrp="1"/>
+          </p:cNvSpPr>
+          <p:nvPr>
+            <p:ph type="title"/>
+          </p:nvPr>
+        </p:nvSpPr>
+        <p:spPr/>
+        <p:txBody>
+          <a:bodyPr/>
+          <a:lstStyle/>
+          <a:p>
+            <a:r>
+              <a:rPr lang="sv-SE" dirty="0"/>
+              <a:t>Prototyper</a:t>
+            </a:r>
+          </a:p>
+        </p:txBody>
+      </p:sp>
+      <p:sp>
+        <p:nvSpPr>
+          <p:cNvPr id="3" name="Platshållare för innehåll 2">
+            <a:extLst>
+              <a:ext uri="{FF2B5EF4-FFF2-40B4-BE49-F238E27FC236}">
+                <a16:creationId xmlns:a16="http://schemas.microsoft.com/office/drawing/2014/main" id="{9A5988AF-121F-493F-BE57-EE0811CBA2AE}"/>
+              </a:ext>
+            </a:extLst>
+          </p:cNvPr>
+          <p:cNvSpPr>
+            <a:spLocks noGrp="1"/>
+          </p:cNvSpPr>
+          <p:nvPr>
+            <p:ph idx="1"/>
+          </p:nvPr>
+        </p:nvSpPr>
+        <p:spPr>
+          <a:xfrm>
+            <a:off x="550863" y="1713187"/>
+            <a:ext cx="11090274" cy="4379638"/>
+          </a:xfrm>
+        </p:spPr>
+        <p:txBody>
+          <a:bodyPr/>
+          <a:lstStyle/>
+          <a:p>
+            <a:pPr marL="0" indent="0">
+              <a:buNone/>
+            </a:pPr>
+            <a:r>
+              <a:rPr lang="sv-SE" dirty="0"/>
+              <a:t>Tre iterationer av prototyper</a:t>
+            </a:r>
+          </a:p>
+        </p:txBody>
+      </p:sp>
+      <p:pic>
+        <p:nvPicPr>
+          <p:cNvPr id="5" name="Bildobjekt 4">
+            <a:extLst>
+              <a:ext uri="{FF2B5EF4-FFF2-40B4-BE49-F238E27FC236}">
+                <a16:creationId xmlns:a16="http://schemas.microsoft.com/office/drawing/2014/main" id="{2D2A01BE-ABA3-49E3-8CAC-79F1A70CCFD7}"/>
+              </a:ext>
+            </a:extLst>
+          </p:cNvPr>
+          <p:cNvPicPr>
+            <a:picLocks noChangeAspect="1"/>
+          </p:cNvPicPr>
+          <p:nvPr/>
+        </p:nvPicPr>
+        <p:blipFill>
+          <a:blip r:embed="rId2"/>
+          <a:stretch>
+            <a:fillRect/>
+          </a:stretch>
+        </p:blipFill>
+        <p:spPr>
+          <a:xfrm>
+            <a:off x="5213475" y="2621675"/>
+            <a:ext cx="6167695" cy="3854810"/>
+          </a:xfrm>
+          <a:prstGeom prst="rect">
+            <a:avLst/>
+          </a:prstGeom>
+        </p:spPr>
+      </p:pic>
+      <p:pic>
+        <p:nvPicPr>
+          <p:cNvPr id="7" name="Bildobjekt 6" descr="En bild som visar text&#10;&#10;Automatiskt genererad beskrivning">
+            <a:extLst>
+              <a:ext uri="{FF2B5EF4-FFF2-40B4-BE49-F238E27FC236}">
+                <a16:creationId xmlns:a16="http://schemas.microsoft.com/office/drawing/2014/main" id="{2CDD859A-4B68-4D8B-BE6C-5B08BF761BFD}"/>
+              </a:ext>
+            </a:extLst>
+          </p:cNvPr>
+          <p:cNvPicPr>
+            <a:picLocks noChangeAspect="1"/>
+          </p:cNvPicPr>
+          <p:nvPr/>
+        </p:nvPicPr>
+        <p:blipFill>
+          <a:blip r:embed="rId3">
+            <a:extLst>
+              <a:ext uri="{28A0092B-C50C-407E-A947-70E740481C1C}">
+                <a14:useLocalDpi xmlns:a14="http://schemas.microsoft.com/office/drawing/2010/main" val="0"/>
+              </a:ext>
+            </a:extLst>
+          </a:blip>
+          <a:stretch>
+            <a:fillRect/>
+          </a:stretch>
+        </p:blipFill>
+        <p:spPr>
+          <a:xfrm>
+            <a:off x="433027" y="2842898"/>
+            <a:ext cx="3545083" cy="3633587"/>
+          </a:xfrm>
+          <a:prstGeom prst="rect">
+            <a:avLst/>
+          </a:prstGeom>
+        </p:spPr>
+      </p:pic>
+    </p:spTree>
+    <p:extLst>
+      <p:ext uri="{BB962C8B-B14F-4D97-AF65-F5344CB8AC3E}">
+        <p14:creationId xmlns:p14="http://schemas.microsoft.com/office/powerpoint/2010/main" val="1659018595"/>
+      </p:ext>
+    </p:extLst>
+  </p:cSld>
+  <p:clrMapOvr>
+    <a:masterClrMapping/>
+  </p:clrMapOvr>
+</p:sld>
+</file>
+
+<file path=ppt/slides/slide7.xml><?xml version="1.0" encoding="utf-8"?>
+<p:sld xmlns:a="http://schemas.openxmlformats.org/drawingml/2006/main" xmlns:r="http://schemas.openxmlformats.org/officeDocument/2006/relationships" xmlns:p="http://schemas.openxmlformats.org/presentationml/2006/main">
+  <p:cSld>
+    <p:spTree>
+      <p:nvGrpSpPr>
+        <p:cNvPr id="1" name=""/>
+        <p:cNvGrpSpPr/>
+        <p:nvPr/>
+      </p:nvGrpSpPr>
+      <p:grpSpPr>
+        <a:xfrm>
+          <a:off x="0" y="0"/>
+          <a:ext cx="0" cy="0"/>
+          <a:chOff x="0" y="0"/>
+          <a:chExt cx="0" cy="0"/>
+        </a:xfrm>
+      </p:grpSpPr>
+      <p:sp>
+        <p:nvSpPr>
+          <p:cNvPr id="2" name="Rubrik 1">
+            <a:extLst>
+              <a:ext uri="{FF2B5EF4-FFF2-40B4-BE49-F238E27FC236}">
                 <a16:creationId xmlns:a16="http://schemas.microsoft.com/office/drawing/2014/main" id="{7767DC5E-94C6-4FF9-9C47-787B0833E6CB}"/>
               </a:ext>
             </a:extLst>
@@ -9007,6 +9442,298 @@
     <p:extLst>
       <p:ext uri="{BB962C8B-B14F-4D97-AF65-F5344CB8AC3E}">
         <p14:creationId xmlns:p14="http://schemas.microsoft.com/office/powerpoint/2010/main" val="2382716734"/>
+      </p:ext>
+    </p:extLst>
+  </p:cSld>
+  <p:clrMapOvr>
+    <a:masterClrMapping/>
+  </p:clrMapOvr>
+</p:sld>
+</file>
+
+<file path=ppt/slides/slide8.xml><?xml version="1.0" encoding="utf-8"?>
+<p:sld xmlns:a="http://schemas.openxmlformats.org/drawingml/2006/main" xmlns:r="http://schemas.openxmlformats.org/officeDocument/2006/relationships" xmlns:p="http://schemas.openxmlformats.org/presentationml/2006/main">
+  <p:cSld>
+    <p:spTree>
+      <p:nvGrpSpPr>
+        <p:cNvPr id="1" name=""/>
+        <p:cNvGrpSpPr/>
+        <p:nvPr/>
+      </p:nvGrpSpPr>
+      <p:grpSpPr>
+        <a:xfrm>
+          <a:off x="0" y="0"/>
+          <a:ext cx="0" cy="0"/>
+          <a:chOff x="0" y="0"/>
+          <a:chExt cx="0" cy="0"/>
+        </a:xfrm>
+      </p:grpSpPr>
+      <p:sp>
+        <p:nvSpPr>
+          <p:cNvPr id="2" name="Rubrik 1">
+            <a:extLst>
+              <a:ext uri="{FF2B5EF4-FFF2-40B4-BE49-F238E27FC236}">
+                <a16:creationId xmlns:a16="http://schemas.microsoft.com/office/drawing/2014/main" id="{7767DC5E-94C6-4FF9-9C47-787B0833E6CB}"/>
+              </a:ext>
+            </a:extLst>
+          </p:cNvPr>
+          <p:cNvSpPr>
+            <a:spLocks noGrp="1"/>
+          </p:cNvSpPr>
+          <p:nvPr>
+            <p:ph type="title"/>
+          </p:nvPr>
+        </p:nvSpPr>
+        <p:spPr>
+          <a:xfrm>
+            <a:off x="550863" y="520994"/>
+            <a:ext cx="11091600" cy="1332000"/>
+          </a:xfrm>
+        </p:spPr>
+        <p:txBody>
+          <a:bodyPr/>
+          <a:lstStyle/>
+          <a:p>
+            <a:r>
+              <a:rPr lang="sv-SE" dirty="0"/>
+              <a:t>Var är vi nu?</a:t>
+            </a:r>
+          </a:p>
+        </p:txBody>
+      </p:sp>
+      <p:sp>
+        <p:nvSpPr>
+          <p:cNvPr id="3" name="Platshållare för innehåll 2">
+            <a:extLst>
+              <a:ext uri="{FF2B5EF4-FFF2-40B4-BE49-F238E27FC236}">
+                <a16:creationId xmlns:a16="http://schemas.microsoft.com/office/drawing/2014/main" id="{CA28809E-7149-46A5-A34E-249F5E23ADC6}"/>
+              </a:ext>
+            </a:extLst>
+          </p:cNvPr>
+          <p:cNvSpPr>
+            <a:spLocks noGrp="1"/>
+          </p:cNvSpPr>
+          <p:nvPr>
+            <p:ph idx="1"/>
+          </p:nvPr>
+        </p:nvSpPr>
+        <p:spPr>
+          <a:xfrm>
+            <a:off x="550863" y="2160333"/>
+            <a:ext cx="11090274" cy="3979625"/>
+          </a:xfrm>
+        </p:spPr>
+        <p:txBody>
+          <a:bodyPr/>
+          <a:lstStyle/>
+          <a:p>
+            <a:r>
+              <a:rPr lang="sv-SE" dirty="0"/>
+              <a:t>Vi har skapat en designbas</a:t>
+            </a:r>
+          </a:p>
+          <a:p>
+            <a:r>
+              <a:rPr lang="sv-SE" dirty="0"/>
+              <a:t>Implementerat databas</a:t>
+            </a:r>
+          </a:p>
+          <a:p>
+            <a:r>
+              <a:rPr lang="sv-SE" dirty="0"/>
+              <a:t>Kopplat hemsidan till databasen</a:t>
+            </a:r>
+            <a:br>
+              <a:rPr lang="sv-SE" dirty="0"/>
+            </a:br>
+            <a:endParaRPr lang="sv-SE" dirty="0"/>
+          </a:p>
+        </p:txBody>
+      </p:sp>
+      <p:pic>
+        <p:nvPicPr>
+          <p:cNvPr id="1028" name="Picture 4" descr="demo">
+            <a:extLst>
+              <a:ext uri="{FF2B5EF4-FFF2-40B4-BE49-F238E27FC236}">
+                <a16:creationId xmlns:a16="http://schemas.microsoft.com/office/drawing/2014/main" id="{36EFB328-2E13-4667-8BF9-4F259DC7C712}"/>
+              </a:ext>
+            </a:extLst>
+          </p:cNvPr>
+          <p:cNvPicPr>
+            <a:picLocks noChangeAspect="1" noChangeArrowheads="1"/>
+          </p:cNvPicPr>
+          <p:nvPr/>
+        </p:nvPicPr>
+        <p:blipFill>
+          <a:blip r:embed="rId2">
+            <a:extLst>
+              <a:ext uri="{28A0092B-C50C-407E-A947-70E740481C1C}">
+                <a14:useLocalDpi xmlns:a14="http://schemas.microsoft.com/office/drawing/2010/main" val="0"/>
+              </a:ext>
+            </a:extLst>
+          </a:blip>
+          <a:srcRect/>
+          <a:stretch>
+            <a:fillRect/>
+          </a:stretch>
+        </p:blipFill>
+        <p:spPr bwMode="auto">
+          <a:xfrm>
+            <a:off x="5202621" y="1708768"/>
+            <a:ext cx="5974449" cy="4308209"/>
+          </a:xfrm>
+          <a:prstGeom prst="rect">
+            <a:avLst/>
+          </a:prstGeom>
+          <a:noFill/>
+          <a:extLst>
+            <a:ext uri="{909E8E84-426E-40DD-AFC4-6F175D3DCCD1}">
+              <a14:hiddenFill xmlns:a14="http://schemas.microsoft.com/office/drawing/2010/main">
+                <a:solidFill>
+                  <a:srgbClr val="FFFFFF"/>
+                </a:solidFill>
+              </a14:hiddenFill>
+            </a:ext>
+          </a:extLst>
+        </p:spPr>
+      </p:pic>
+      <p:sp>
+        <p:nvSpPr>
+          <p:cNvPr id="4" name="Rektangel 3">
+            <a:extLst>
+              <a:ext uri="{FF2B5EF4-FFF2-40B4-BE49-F238E27FC236}">
+                <a16:creationId xmlns:a16="http://schemas.microsoft.com/office/drawing/2014/main" id="{63C04421-5D93-4234-BF4D-B315717B361D}"/>
+              </a:ext>
+            </a:extLst>
+          </p:cNvPr>
+          <p:cNvSpPr/>
+          <p:nvPr/>
+        </p:nvSpPr>
+        <p:spPr>
+          <a:xfrm>
+            <a:off x="6367215" y="5409284"/>
+            <a:ext cx="1643720" cy="923330"/>
+          </a:xfrm>
+          <a:prstGeom prst="rect">
+            <a:avLst/>
+          </a:prstGeom>
+          <a:noFill/>
+        </p:spPr>
+        <p:txBody>
+          <a:bodyPr wrap="none" lIns="91440" tIns="45720" rIns="91440" bIns="45720">
+            <a:spAutoFit/>
+          </a:bodyPr>
+          <a:lstStyle/>
+          <a:p>
+            <a:pPr algn="ctr"/>
+            <a:r>
+              <a:rPr lang="sv-SE" sz="5400" b="1" cap="none" spc="0" dirty="0">
+                <a:ln w="12700">
+                  <a:solidFill>
+                    <a:schemeClr val="accent5"/>
+                  </a:solidFill>
+                  <a:prstDash val="solid"/>
+                </a:ln>
+                <a:solidFill>
+                  <a:schemeClr val="accent6">
+                    <a:lumMod val="20000"/>
+                    <a:lumOff val="80000"/>
+                  </a:schemeClr>
+                </a:solidFill>
+                <a:effectLst/>
+              </a:rPr>
+              <a:t>Filip</a:t>
+            </a:r>
+          </a:p>
+        </p:txBody>
+      </p:sp>
+    </p:spTree>
+    <p:extLst>
+      <p:ext uri="{BB962C8B-B14F-4D97-AF65-F5344CB8AC3E}">
+        <p14:creationId xmlns:p14="http://schemas.microsoft.com/office/powerpoint/2010/main" val="2927480642"/>
+      </p:ext>
+    </p:extLst>
+  </p:cSld>
+  <p:clrMapOvr>
+    <a:masterClrMapping/>
+  </p:clrMapOvr>
+</p:sld>
+</file>
+
+<file path=ppt/slides/slide9.xml><?xml version="1.0" encoding="utf-8"?>
+<p:sld xmlns:a="http://schemas.openxmlformats.org/drawingml/2006/main" xmlns:r="http://schemas.openxmlformats.org/officeDocument/2006/relationships" xmlns:p="http://schemas.openxmlformats.org/presentationml/2006/main">
+  <p:cSld>
+    <p:spTree>
+      <p:nvGrpSpPr>
+        <p:cNvPr id="1" name=""/>
+        <p:cNvGrpSpPr/>
+        <p:nvPr/>
+      </p:nvGrpSpPr>
+      <p:grpSpPr>
+        <a:xfrm>
+          <a:off x="0" y="0"/>
+          <a:ext cx="0" cy="0"/>
+          <a:chOff x="0" y="0"/>
+          <a:chExt cx="0" cy="0"/>
+        </a:xfrm>
+      </p:grpSpPr>
+      <p:sp>
+        <p:nvSpPr>
+          <p:cNvPr id="2" name="Rubrik 1">
+            <a:extLst>
+              <a:ext uri="{FF2B5EF4-FFF2-40B4-BE49-F238E27FC236}">
+                <a16:creationId xmlns:a16="http://schemas.microsoft.com/office/drawing/2014/main" id="{C1FD5ACB-50C6-48A3-AD86-D1153B361578}"/>
+              </a:ext>
+            </a:extLst>
+          </p:cNvPr>
+          <p:cNvSpPr>
+            <a:spLocks noGrp="1"/>
+          </p:cNvSpPr>
+          <p:nvPr>
+            <p:ph type="title"/>
+          </p:nvPr>
+        </p:nvSpPr>
+        <p:spPr/>
+        <p:txBody>
+          <a:bodyPr/>
+          <a:lstStyle/>
+          <a:p>
+            <a:r>
+              <a:rPr lang="sv-SE" dirty="0"/>
+              <a:t>Möjligheter och risker</a:t>
+            </a:r>
+          </a:p>
+        </p:txBody>
+      </p:sp>
+      <p:sp>
+        <p:nvSpPr>
+          <p:cNvPr id="3" name="Platshållare för innehåll 2">
+            <a:extLst>
+              <a:ext uri="{FF2B5EF4-FFF2-40B4-BE49-F238E27FC236}">
+                <a16:creationId xmlns:a16="http://schemas.microsoft.com/office/drawing/2014/main" id="{478837E4-BA69-48F2-A5B1-02BE5560D7C9}"/>
+              </a:ext>
+            </a:extLst>
+          </p:cNvPr>
+          <p:cNvSpPr>
+            <a:spLocks noGrp="1"/>
+          </p:cNvSpPr>
+          <p:nvPr>
+            <p:ph idx="1"/>
+          </p:nvPr>
+        </p:nvSpPr>
+        <p:spPr/>
+        <p:txBody>
+          <a:bodyPr/>
+          <a:lstStyle/>
+          <a:p>
+            <a:endParaRPr lang="sv-SE" dirty="0"/>
+          </a:p>
+        </p:txBody>
+      </p:sp>
+    </p:spTree>
+    <p:extLst>
+      <p:ext uri="{BB962C8B-B14F-4D97-AF65-F5344CB8AC3E}">
+        <p14:creationId xmlns:p14="http://schemas.microsoft.com/office/powerpoint/2010/main" val="2844161484"/>
       </p:ext>
     </p:extLst>
   </p:cSld>

</xml_diff>

<commit_message>
La till om risker
</commit_message>
<xml_diff>
--- a/Delredovisning/Sustainable Forms presentation.pptx
+++ b/Delredovisning/Sustainable Forms presentation.pptx
@@ -10128,12 +10128,38 @@
             <p:ph idx="1"/>
           </p:nvPr>
         </p:nvSpPr>
-        <p:spPr/>
+        <p:spPr>
+          <a:xfrm>
+            <a:off x="550863" y="2329100"/>
+            <a:ext cx="11090274" cy="3979625"/>
+          </a:xfrm>
+        </p:spPr>
         <p:txBody>
           <a:bodyPr/>
           <a:lstStyle/>
           <a:p>
-            <a:endParaRPr lang="sv-SE" dirty="0"/>
+            <a:r>
+              <a:rPr lang="sv-SE" dirty="0"/>
+              <a:t>identifierade både projekt- och produktrisker</a:t>
+            </a:r>
+          </a:p>
+          <a:p>
+            <a:r>
+              <a:rPr lang="sv-SE" dirty="0"/>
+              <a:t>bristfällig kommunikation bland projektmedlemmarna.</a:t>
+            </a:r>
+          </a:p>
+          <a:p>
+            <a:r>
+              <a:rPr lang="sv-SE" dirty="0"/>
+              <a:t>produkten inte skulle vara tillräckligt intuitiv</a:t>
+            </a:r>
+          </a:p>
+          <a:p>
+            <a:r>
+              <a:rPr lang="sv-SE" dirty="0"/>
+              <a:t>Möjligheter –&gt; bättre planering </a:t>
+            </a:r>
           </a:p>
         </p:txBody>
       </p:sp>

</xml_diff>